<commit_message>
IP-23 #comment updated ERD with orders table
</commit_message>
<xml_diff>
--- a/ERD Diagram.pptx
+++ b/ERD Diagram.pptx
@@ -115,143 +115,12 @@
 <file path=ppt/revisionInfo.xml><?xml version="1.0" encoding="utf-8"?>
 <p1510:revInfo xmlns:a="http://schemas.openxmlformats.org/drawingml/2006/main" xmlns:r="http://schemas.openxmlformats.org/officeDocument/2006/relationships" xmlns:p1510="http://schemas.microsoft.com/office/powerpoint/2015/10/main">
   <p1510:revLst>
+    <p1510:client id="{119B3020-D453-44D8-AD8F-8ABAA00DB304}" v="92" dt="2021-02-22T17:20:17.332"/>
     <p1510:client id="{334F7092-5222-473D-BA82-EE624125B977}" v="46" dt="2021-02-19T10:42:50.393"/>
     <p1510:client id="{397F9719-FE52-4986-B333-C3A36B00E7D3}" v="388" dt="2021-02-18T14:38:25.716"/>
+    <p1510:client id="{9570B300-E89A-4741-82BE-23DB68BDB92B}" v="30" dt="2021-02-23T12:38:32.126"/>
   </p1510:revLst>
 </p1510:revInfo>
-</file>
-
-<file path=ppt/changesInfos/changesInfo1.xml><?xml version="1.0" encoding="utf-8"?>
-<pc:chgInfo xmlns:a="http://schemas.openxmlformats.org/drawingml/2006/main" xmlns:r="http://schemas.openxmlformats.org/officeDocument/2006/relationships" xmlns:ac="http://schemas.microsoft.com/office/drawing/2013/main/command" xmlns:pc="http://schemas.microsoft.com/office/powerpoint/2013/main/command">
-  <pc:docChgLst>
-    <pc:chgData name="Nung, Alex" userId="S::anung@qa.com::dea1afe7-adc1-4c8a-a35d-661d3042211f" providerId="AD" clId="Web-{334F7092-5222-473D-BA82-EE624125B977}"/>
-    <pc:docChg chg="modSld">
-      <pc:chgData name="Nung, Alex" userId="S::anung@qa.com::dea1afe7-adc1-4c8a-a35d-661d3042211f" providerId="AD" clId="Web-{334F7092-5222-473D-BA82-EE624125B977}" dt="2021-02-19T10:42:50.393" v="41" actId="14100"/>
-      <pc:docMkLst>
-        <pc:docMk/>
-      </pc:docMkLst>
-      <pc:sldChg chg="modSp">
-        <pc:chgData name="Nung, Alex" userId="S::anung@qa.com::dea1afe7-adc1-4c8a-a35d-661d3042211f" providerId="AD" clId="Web-{334F7092-5222-473D-BA82-EE624125B977}" dt="2021-02-19T10:42:50.393" v="41" actId="14100"/>
-        <pc:sldMkLst>
-          <pc:docMk/>
-          <pc:sldMk cId="109857222" sldId="256"/>
-        </pc:sldMkLst>
-        <pc:spChg chg="mod">
-          <ac:chgData name="Nung, Alex" userId="S::anung@qa.com::dea1afe7-adc1-4c8a-a35d-661d3042211f" providerId="AD" clId="Web-{334F7092-5222-473D-BA82-EE624125B977}" dt="2021-02-19T10:41:03.502" v="20" actId="1076"/>
-          <ac:spMkLst>
-            <pc:docMk/>
-            <pc:sldMk cId="109857222" sldId="256"/>
-            <ac:spMk id="4" creationId="{097352D6-A594-4132-A088-D4466ED1FA9E}"/>
-          </ac:spMkLst>
-        </pc:spChg>
-        <pc:spChg chg="mod">
-          <ac:chgData name="Nung, Alex" userId="S::anung@qa.com::dea1afe7-adc1-4c8a-a35d-661d3042211f" providerId="AD" clId="Web-{334F7092-5222-473D-BA82-EE624125B977}" dt="2021-02-19T10:40:53.862" v="18" actId="14100"/>
-          <ac:spMkLst>
-            <pc:docMk/>
-            <pc:sldMk cId="109857222" sldId="256"/>
-            <ac:spMk id="5" creationId="{62F7FD9F-505F-4980-8E10-6705B428271F}"/>
-          </ac:spMkLst>
-        </pc:spChg>
-        <pc:spChg chg="mod">
-          <ac:chgData name="Nung, Alex" userId="S::anung@qa.com::dea1afe7-adc1-4c8a-a35d-661d3042211f" providerId="AD" clId="Web-{334F7092-5222-473D-BA82-EE624125B977}" dt="2021-02-19T10:42:29.081" v="38" actId="20577"/>
-          <ac:spMkLst>
-            <pc:docMk/>
-            <pc:sldMk cId="109857222" sldId="256"/>
-            <ac:spMk id="6" creationId="{DB4496ED-D8F3-4F5C-AA26-E26BD653B233}"/>
-          </ac:spMkLst>
-        </pc:spChg>
-        <pc:cxnChg chg="mod">
-          <ac:chgData name="Nung, Alex" userId="S::anung@qa.com::dea1afe7-adc1-4c8a-a35d-661d3042211f" providerId="AD" clId="Web-{334F7092-5222-473D-BA82-EE624125B977}" dt="2021-02-19T10:42:36.674" v="39" actId="14100"/>
-          <ac:cxnSpMkLst>
-            <pc:docMk/>
-            <pc:sldMk cId="109857222" sldId="256"/>
-            <ac:cxnSpMk id="7" creationId="{BAA0BA53-B469-45A8-B9CC-0577B7EC16F9}"/>
-          </ac:cxnSpMkLst>
-        </pc:cxnChg>
-        <pc:cxnChg chg="mod">
-          <ac:chgData name="Nung, Alex" userId="S::anung@qa.com::dea1afe7-adc1-4c8a-a35d-661d3042211f" providerId="AD" clId="Web-{334F7092-5222-473D-BA82-EE624125B977}" dt="2021-02-19T10:42:50.393" v="41" actId="14100"/>
-          <ac:cxnSpMkLst>
-            <pc:docMk/>
-            <pc:sldMk cId="109857222" sldId="256"/>
-            <ac:cxnSpMk id="8" creationId="{7900A36E-233F-4FA6-B5A0-CAD4A6216425}"/>
-          </ac:cxnSpMkLst>
-        </pc:cxnChg>
-      </pc:sldChg>
-    </pc:docChg>
-  </pc:docChgLst>
-  <pc:docChgLst>
-    <pc:chgData name="Nung, Alex" userId="S::anung@qa.com::dea1afe7-adc1-4c8a-a35d-661d3042211f" providerId="AD" clId="Web-{397F9719-FE52-4986-B333-C3A36B00E7D3}"/>
-    <pc:docChg chg="modSld">
-      <pc:chgData name="Nung, Alex" userId="S::anung@qa.com::dea1afe7-adc1-4c8a-a35d-661d3042211f" providerId="AD" clId="Web-{397F9719-FE52-4986-B333-C3A36B00E7D3}" dt="2021-02-18T14:38:25.716" v="367" actId="14100"/>
-      <pc:docMkLst>
-        <pc:docMk/>
-      </pc:docMkLst>
-      <pc:sldChg chg="addSp delSp modSp">
-        <pc:chgData name="Nung, Alex" userId="S::anung@qa.com::dea1afe7-adc1-4c8a-a35d-661d3042211f" providerId="AD" clId="Web-{397F9719-FE52-4986-B333-C3A36B00E7D3}" dt="2021-02-18T14:38:25.716" v="367" actId="14100"/>
-        <pc:sldMkLst>
-          <pc:docMk/>
-          <pc:sldMk cId="109857222" sldId="256"/>
-        </pc:sldMkLst>
-        <pc:spChg chg="del">
-          <ac:chgData name="Nung, Alex" userId="S::anung@qa.com::dea1afe7-adc1-4c8a-a35d-661d3042211f" providerId="AD" clId="Web-{397F9719-FE52-4986-B333-C3A36B00E7D3}" dt="2021-02-18T14:17:31.360" v="1"/>
-          <ac:spMkLst>
-            <pc:docMk/>
-            <pc:sldMk cId="109857222" sldId="256"/>
-            <ac:spMk id="2" creationId="{00000000-0000-0000-0000-000000000000}"/>
-          </ac:spMkLst>
-        </pc:spChg>
-        <pc:spChg chg="del">
-          <ac:chgData name="Nung, Alex" userId="S::anung@qa.com::dea1afe7-adc1-4c8a-a35d-661d3042211f" providerId="AD" clId="Web-{397F9719-FE52-4986-B333-C3A36B00E7D3}" dt="2021-02-18T14:17:31.360" v="0"/>
-          <ac:spMkLst>
-            <pc:docMk/>
-            <pc:sldMk cId="109857222" sldId="256"/>
-            <ac:spMk id="3" creationId="{00000000-0000-0000-0000-000000000000}"/>
-          </ac:spMkLst>
-        </pc:spChg>
-        <pc:spChg chg="add mod">
-          <ac:chgData name="Nung, Alex" userId="S::anung@qa.com::dea1afe7-adc1-4c8a-a35d-661d3042211f" providerId="AD" clId="Web-{397F9719-FE52-4986-B333-C3A36B00E7D3}" dt="2021-02-18T14:34:58.576" v="341" actId="20577"/>
-          <ac:spMkLst>
-            <pc:docMk/>
-            <pc:sldMk cId="109857222" sldId="256"/>
-            <ac:spMk id="4" creationId="{097352D6-A594-4132-A088-D4466ED1FA9E}"/>
-          </ac:spMkLst>
-        </pc:spChg>
-        <pc:spChg chg="add mod">
-          <ac:chgData name="Nung, Alex" userId="S::anung@qa.com::dea1afe7-adc1-4c8a-a35d-661d3042211f" providerId="AD" clId="Web-{397F9719-FE52-4986-B333-C3A36B00E7D3}" dt="2021-02-18T14:36:53.404" v="350" actId="20577"/>
-          <ac:spMkLst>
-            <pc:docMk/>
-            <pc:sldMk cId="109857222" sldId="256"/>
-            <ac:spMk id="5" creationId="{62F7FD9F-505F-4980-8E10-6705B428271F}"/>
-          </ac:spMkLst>
-        </pc:spChg>
-        <pc:spChg chg="add mod">
-          <ac:chgData name="Nung, Alex" userId="S::anung@qa.com::dea1afe7-adc1-4c8a-a35d-661d3042211f" providerId="AD" clId="Web-{397F9719-FE52-4986-B333-C3A36B00E7D3}" dt="2021-02-18T14:37:50.498" v="366" actId="20577"/>
-          <ac:spMkLst>
-            <pc:docMk/>
-            <pc:sldMk cId="109857222" sldId="256"/>
-            <ac:spMk id="6" creationId="{DB4496ED-D8F3-4F5C-AA26-E26BD653B233}"/>
-          </ac:spMkLst>
-        </pc:spChg>
-        <pc:cxnChg chg="add mod">
-          <ac:chgData name="Nung, Alex" userId="S::anung@qa.com::dea1afe7-adc1-4c8a-a35d-661d3042211f" providerId="AD" clId="Web-{397F9719-FE52-4986-B333-C3A36B00E7D3}" dt="2021-02-18T14:34:31.233" v="331" actId="14100"/>
-          <ac:cxnSpMkLst>
-            <pc:docMk/>
-            <pc:sldMk cId="109857222" sldId="256"/>
-            <ac:cxnSpMk id="7" creationId="{BAA0BA53-B469-45A8-B9CC-0577B7EC16F9}"/>
-          </ac:cxnSpMkLst>
-        </pc:cxnChg>
-        <pc:cxnChg chg="add mod">
-          <ac:chgData name="Nung, Alex" userId="S::anung@qa.com::dea1afe7-adc1-4c8a-a35d-661d3042211f" providerId="AD" clId="Web-{397F9719-FE52-4986-B333-C3A36B00E7D3}" dt="2021-02-18T14:38:25.716" v="367" actId="14100"/>
-          <ac:cxnSpMkLst>
-            <pc:docMk/>
-            <pc:sldMk cId="109857222" sldId="256"/>
-            <ac:cxnSpMk id="8" creationId="{7900A36E-233F-4FA6-B5A0-CAD4A6216425}"/>
-          </ac:cxnSpMkLst>
-        </pc:cxnChg>
-      </pc:sldChg>
-    </pc:docChg>
-  </pc:docChgLst>
-</pc:chgInfo>
 </file>
 
 <file path=ppt/slideLayouts/slideLayout1.xml><?xml version="1.0" encoding="utf-8"?>
@@ -385,7 +254,7 @@
           <a:p>
             <a:fld id="{846CE7D5-CF57-46EF-B807-FDD0502418D4}" type="datetimeFigureOut">
               <a:rPr lang="en-GB" smtClean="0"/>
-              <a:t>19/02/2021</a:t>
+              <a:t>23/02/2021</a:t>
             </a:fld>
             <a:endParaRPr lang="en-GB"/>
           </a:p>
@@ -555,7 +424,7 @@
           <a:p>
             <a:fld id="{846CE7D5-CF57-46EF-B807-FDD0502418D4}" type="datetimeFigureOut">
               <a:rPr lang="en-GB" smtClean="0"/>
-              <a:t>19/02/2021</a:t>
+              <a:t>23/02/2021</a:t>
             </a:fld>
             <a:endParaRPr lang="en-GB"/>
           </a:p>
@@ -735,7 +604,7 @@
           <a:p>
             <a:fld id="{846CE7D5-CF57-46EF-B807-FDD0502418D4}" type="datetimeFigureOut">
               <a:rPr lang="en-GB" smtClean="0"/>
-              <a:t>19/02/2021</a:t>
+              <a:t>23/02/2021</a:t>
             </a:fld>
             <a:endParaRPr lang="en-GB"/>
           </a:p>
@@ -905,7 +774,7 @@
           <a:p>
             <a:fld id="{846CE7D5-CF57-46EF-B807-FDD0502418D4}" type="datetimeFigureOut">
               <a:rPr lang="en-GB" smtClean="0"/>
-              <a:t>19/02/2021</a:t>
+              <a:t>23/02/2021</a:t>
             </a:fld>
             <a:endParaRPr lang="en-GB"/>
           </a:p>
@@ -1151,7 +1020,7 @@
           <a:p>
             <a:fld id="{846CE7D5-CF57-46EF-B807-FDD0502418D4}" type="datetimeFigureOut">
               <a:rPr lang="en-GB" smtClean="0"/>
-              <a:t>19/02/2021</a:t>
+              <a:t>23/02/2021</a:t>
             </a:fld>
             <a:endParaRPr lang="en-GB"/>
           </a:p>
@@ -1383,7 +1252,7 @@
           <a:p>
             <a:fld id="{846CE7D5-CF57-46EF-B807-FDD0502418D4}" type="datetimeFigureOut">
               <a:rPr lang="en-GB" smtClean="0"/>
-              <a:t>19/02/2021</a:t>
+              <a:t>23/02/2021</a:t>
             </a:fld>
             <a:endParaRPr lang="en-GB"/>
           </a:p>
@@ -1750,7 +1619,7 @@
           <a:p>
             <a:fld id="{846CE7D5-CF57-46EF-B807-FDD0502418D4}" type="datetimeFigureOut">
               <a:rPr lang="en-GB" smtClean="0"/>
-              <a:t>19/02/2021</a:t>
+              <a:t>23/02/2021</a:t>
             </a:fld>
             <a:endParaRPr lang="en-GB"/>
           </a:p>
@@ -1868,7 +1737,7 @@
           <a:p>
             <a:fld id="{846CE7D5-CF57-46EF-B807-FDD0502418D4}" type="datetimeFigureOut">
               <a:rPr lang="en-GB" smtClean="0"/>
-              <a:t>19/02/2021</a:t>
+              <a:t>23/02/2021</a:t>
             </a:fld>
             <a:endParaRPr lang="en-GB"/>
           </a:p>
@@ -1963,7 +1832,7 @@
           <a:p>
             <a:fld id="{846CE7D5-CF57-46EF-B807-FDD0502418D4}" type="datetimeFigureOut">
               <a:rPr lang="en-GB" smtClean="0"/>
-              <a:t>19/02/2021</a:t>
+              <a:t>23/02/2021</a:t>
             </a:fld>
             <a:endParaRPr lang="en-GB"/>
           </a:p>
@@ -2240,7 +2109,7 @@
           <a:p>
             <a:fld id="{846CE7D5-CF57-46EF-B807-FDD0502418D4}" type="datetimeFigureOut">
               <a:rPr lang="en-GB" smtClean="0"/>
-              <a:t>19/02/2021</a:t>
+              <a:t>23/02/2021</a:t>
             </a:fld>
             <a:endParaRPr lang="en-GB"/>
           </a:p>
@@ -2497,7 +2366,7 @@
           <a:p>
             <a:fld id="{846CE7D5-CF57-46EF-B807-FDD0502418D4}" type="datetimeFigureOut">
               <a:rPr lang="en-GB" smtClean="0"/>
-              <a:t>19/02/2021</a:t>
+              <a:t>23/02/2021</a:t>
             </a:fld>
             <a:endParaRPr lang="en-GB"/>
           </a:p>
@@ -2710,7 +2579,7 @@
           <a:p>
             <a:fld id="{846CE7D5-CF57-46EF-B807-FDD0502418D4}" type="datetimeFigureOut">
               <a:rPr lang="en-GB" smtClean="0"/>
-              <a:t>19/02/2021</a:t>
+              <a:t>23/02/2021</a:t>
             </a:fld>
             <a:endParaRPr lang="en-GB"/>
           </a:p>
@@ -3115,6 +2984,50 @@
           <a:chExt cx="0" cy="0"/>
         </a:xfrm>
       </p:grpSpPr>
+      <p:cxnSp>
+        <p:nvCxnSpPr>
+          <p:cNvPr id="13" name="Connector: Curved 12">
+            <a:extLst>
+              <a:ext uri="{FF2B5EF4-FFF2-40B4-BE49-F238E27FC236}">
+                <a16:creationId xmlns:a16="http://schemas.microsoft.com/office/drawing/2014/main" id="{F4949738-6B8C-420D-B906-8303ACA71CB5}"/>
+              </a:ext>
+            </a:extLst>
+          </p:cNvPr>
+          <p:cNvCxnSpPr>
+            <a:cxnSpLocks/>
+          </p:cNvCxnSpPr>
+          <p:nvPr/>
+        </p:nvCxnSpPr>
+        <p:spPr>
+          <a:xfrm>
+            <a:off x="4535819" y="874852"/>
+            <a:ext cx="3858111" cy="3844160"/>
+          </a:xfrm>
+          <a:prstGeom prst="curvedConnector3">
+            <a:avLst/>
+          </a:prstGeom>
+          <a:ln w="12700">
+            <a:solidFill>
+              <a:schemeClr val="tx1"/>
+            </a:solidFill>
+            <a:prstDash val="sysDot"/>
+          </a:ln>
+        </p:spPr>
+        <p:style>
+          <a:lnRef idx="1">
+            <a:schemeClr val="accent1"/>
+          </a:lnRef>
+          <a:fillRef idx="0">
+            <a:schemeClr val="accent1"/>
+          </a:fillRef>
+          <a:effectRef idx="0">
+            <a:schemeClr val="accent1"/>
+          </a:effectRef>
+          <a:fontRef idx="minor">
+            <a:schemeClr val="tx1"/>
+          </a:fontRef>
+        </p:style>
+      </p:cxnSp>
       <p:sp>
         <p:nvSpPr>
           <p:cNvPr id="4" name="Rectangle 3">
@@ -3129,7 +3042,7 @@
         </p:nvSpPr>
         <p:spPr>
           <a:xfrm>
-            <a:off x="389209" y="634189"/>
+            <a:off x="6891638" y="462948"/>
             <a:ext cx="4034306" cy="1083516"/>
           </a:xfrm>
           <a:prstGeom prst="rect">
@@ -3261,7 +3174,7 @@
         </p:nvSpPr>
         <p:spPr>
           <a:xfrm>
-            <a:off x="389208" y="1885020"/>
+            <a:off x="832760" y="474751"/>
             <a:ext cx="4034306" cy="1083515"/>
           </a:xfrm>
           <a:prstGeom prst="rect">
@@ -3397,7 +3310,7 @@
         </p:nvSpPr>
         <p:spPr>
           <a:xfrm>
-            <a:off x="4778808" y="1135036"/>
+            <a:off x="6990132" y="3779827"/>
             <a:ext cx="4222382" cy="1428572"/>
           </a:xfrm>
           <a:prstGeom prst="rect">
@@ -3549,9 +3462,9 @@
           <p:nvPr/>
         </p:nvCxnSpPr>
         <p:spPr>
-          <a:xfrm>
-            <a:off x="4270106" y="1061599"/>
-            <a:ext cx="1820422" cy="789492"/>
+          <a:xfrm flipV="1">
+            <a:off x="4844985" y="571291"/>
+            <a:ext cx="2053893" cy="9417"/>
           </a:xfrm>
           <a:prstGeom prst="straightConnector1">
             <a:avLst/>
@@ -3593,9 +3506,9 @@
           <p:nvPr/>
         </p:nvCxnSpPr>
         <p:spPr>
-          <a:xfrm flipV="1">
-            <a:off x="4088356" y="2118388"/>
-            <a:ext cx="2212596" cy="182162"/>
+          <a:xfrm flipH="1">
+            <a:off x="5181449" y="1490483"/>
+            <a:ext cx="1688389" cy="1522304"/>
           </a:xfrm>
           <a:prstGeom prst="straightConnector1">
             <a:avLst/>
@@ -3605,6 +3518,342 @@
               <a:schemeClr val="tx1"/>
             </a:solidFill>
             <a:tailEnd type="triangle"/>
+          </a:ln>
+        </p:spPr>
+        <p:style>
+          <a:lnRef idx="1">
+            <a:schemeClr val="accent1"/>
+          </a:lnRef>
+          <a:fillRef idx="0">
+            <a:schemeClr val="accent1"/>
+          </a:fillRef>
+          <a:effectRef idx="0">
+            <a:schemeClr val="accent1"/>
+          </a:effectRef>
+          <a:fontRef idx="minor">
+            <a:schemeClr val="tx1"/>
+          </a:fontRef>
+        </p:style>
+      </p:cxnSp>
+      <p:sp>
+        <p:nvSpPr>
+          <p:cNvPr id="9" name="Rectangle 8">
+            <a:extLst>
+              <a:ext uri="{FF2B5EF4-FFF2-40B4-BE49-F238E27FC236}">
+                <a16:creationId xmlns:a16="http://schemas.microsoft.com/office/drawing/2014/main" id="{4155F300-75DF-46B4-9CB3-4DA166A43DFE}"/>
+              </a:ext>
+            </a:extLst>
+          </p:cNvPr>
+          <p:cNvSpPr/>
+          <p:nvPr/>
+        </p:nvSpPr>
+        <p:spPr>
+          <a:xfrm>
+            <a:off x="1718791" y="3066108"/>
+            <a:ext cx="4222382" cy="1428572"/>
+          </a:xfrm>
+          <a:prstGeom prst="rect">
+            <a:avLst/>
+          </a:prstGeom>
+          <a:noFill/>
+          <a:ln>
+            <a:solidFill>
+              <a:schemeClr val="tx1"/>
+            </a:solidFill>
+          </a:ln>
+        </p:spPr>
+        <p:style>
+          <a:lnRef idx="2">
+            <a:schemeClr val="accent1">
+              <a:shade val="50000"/>
+            </a:schemeClr>
+          </a:lnRef>
+          <a:fillRef idx="1">
+            <a:schemeClr val="accent1"/>
+          </a:fillRef>
+          <a:effectRef idx="0">
+            <a:schemeClr val="accent1"/>
+          </a:effectRef>
+          <a:fontRef idx="minor">
+            <a:schemeClr val="lt1"/>
+          </a:fontRef>
+        </p:style>
+        <p:txBody>
+          <a:bodyPr lIns="91440" tIns="45720" rIns="91440" bIns="45720" rtlCol="0" anchor="ctr"/>
+          <a:lstStyle/>
+          <a:p>
+            <a:pPr algn="ctr"/>
+            <a:r>
+              <a:rPr lang="en-GB" u="sng" dirty="0">
+                <a:solidFill>
+                  <a:schemeClr val="tx1"/>
+                </a:solidFill>
+                <a:cs typeface="Calibri"/>
+              </a:rPr>
+              <a:t>                       </a:t>
+            </a:r>
+            <a:r>
+              <a:rPr lang="en-GB" u="sng" dirty="0" err="1">
+                <a:solidFill>
+                  <a:schemeClr val="tx1"/>
+                </a:solidFill>
+                <a:cs typeface="Calibri"/>
+              </a:rPr>
+              <a:t>Order_details</a:t>
+            </a:r>
+            <a:r>
+              <a:rPr lang="en-GB" u="sng" dirty="0">
+                <a:solidFill>
+                  <a:schemeClr val="tx1"/>
+                </a:solidFill>
+                <a:cs typeface="Calibri"/>
+              </a:rPr>
+              <a:t>                    </a:t>
+            </a:r>
+          </a:p>
+          <a:p>
+            <a:pPr algn="ctr"/>
+            <a:r>
+              <a:rPr lang="en-GB" dirty="0">
+                <a:solidFill>
+                  <a:schemeClr val="tx1"/>
+                </a:solidFill>
+                <a:cs typeface="Calibri"/>
+              </a:rPr>
+              <a:t>FID (int, Primary, Not Null, </a:t>
+            </a:r>
+            <a:r>
+              <a:rPr lang="en-GB" dirty="0" err="1">
+                <a:solidFill>
+                  <a:schemeClr val="tx1"/>
+                </a:solidFill>
+                <a:cs typeface="Calibri"/>
+              </a:rPr>
+              <a:t>Auto_incr</a:t>
+            </a:r>
+            <a:r>
+              <a:rPr lang="en-GB" dirty="0">
+                <a:solidFill>
+                  <a:schemeClr val="tx1"/>
+                </a:solidFill>
+                <a:cs typeface="Calibri"/>
+              </a:rPr>
+              <a:t>)</a:t>
+            </a:r>
+          </a:p>
+          <a:p>
+            <a:pPr algn="ctr"/>
+            <a:r>
+              <a:rPr lang="en-GB" dirty="0" err="1">
+                <a:solidFill>
+                  <a:schemeClr val="tx1"/>
+                </a:solidFill>
+                <a:cs typeface="Calibri"/>
+              </a:rPr>
+              <a:t>order_id</a:t>
+            </a:r>
+            <a:r>
+              <a:rPr lang="en-GB" dirty="0">
+                <a:solidFill>
+                  <a:schemeClr val="tx1"/>
+                </a:solidFill>
+                <a:cs typeface="Calibri"/>
+              </a:rPr>
+              <a:t>(int, Not Null)</a:t>
+            </a:r>
+          </a:p>
+          <a:p>
+            <a:pPr algn="ctr"/>
+            <a:r>
+              <a:rPr lang="en-GB" dirty="0" err="1">
+                <a:solidFill>
+                  <a:schemeClr val="tx1"/>
+                </a:solidFill>
+                <a:cs typeface="Calibri"/>
+              </a:rPr>
+              <a:t>Item_id</a:t>
+            </a:r>
+            <a:r>
+              <a:rPr lang="en-GB" dirty="0">
+                <a:solidFill>
+                  <a:schemeClr val="tx1"/>
+                </a:solidFill>
+                <a:cs typeface="Calibri"/>
+              </a:rPr>
+              <a:t>(int, Not Null)</a:t>
+            </a:r>
+          </a:p>
+          <a:p>
+            <a:pPr algn="ctr"/>
+            <a:r>
+              <a:rPr lang="en-GB" dirty="0">
+                <a:solidFill>
+                  <a:schemeClr val="tx1"/>
+                </a:solidFill>
+                <a:cs typeface="Calibri"/>
+              </a:rPr>
+              <a:t>Quantity(int)</a:t>
+            </a:r>
+          </a:p>
+        </p:txBody>
+      </p:sp>
+      <p:cxnSp>
+        <p:nvCxnSpPr>
+          <p:cNvPr id="10" name="Straight Arrow Connector 9">
+            <a:extLst>
+              <a:ext uri="{FF2B5EF4-FFF2-40B4-BE49-F238E27FC236}">
+                <a16:creationId xmlns:a16="http://schemas.microsoft.com/office/drawing/2014/main" id="{5AF23334-3E5A-4E58-B327-4FC2BA48A6BC}"/>
+              </a:ext>
+            </a:extLst>
+          </p:cNvPr>
+          <p:cNvCxnSpPr>
+            <a:cxnSpLocks/>
+          </p:cNvCxnSpPr>
+          <p:nvPr/>
+        </p:nvCxnSpPr>
+        <p:spPr>
+          <a:xfrm>
+            <a:off x="5959343" y="4298144"/>
+            <a:ext cx="1040733" cy="9677"/>
+          </a:xfrm>
+          <a:prstGeom prst="straightConnector1">
+            <a:avLst/>
+          </a:prstGeom>
+          <a:ln>
+            <a:solidFill>
+              <a:schemeClr val="tx1"/>
+            </a:solidFill>
+            <a:tailEnd type="triangle"/>
+          </a:ln>
+        </p:spPr>
+        <p:style>
+          <a:lnRef idx="1">
+            <a:schemeClr val="accent1"/>
+          </a:lnRef>
+          <a:fillRef idx="0">
+            <a:schemeClr val="accent1"/>
+          </a:fillRef>
+          <a:effectRef idx="0">
+            <a:schemeClr val="accent1"/>
+          </a:effectRef>
+          <a:fontRef idx="minor">
+            <a:schemeClr val="tx1"/>
+          </a:fontRef>
+        </p:style>
+      </p:cxnSp>
+      <p:cxnSp>
+        <p:nvCxnSpPr>
+          <p:cNvPr id="2" name="Connector: Curved 1">
+            <a:extLst>
+              <a:ext uri="{FF2B5EF4-FFF2-40B4-BE49-F238E27FC236}">
+                <a16:creationId xmlns:a16="http://schemas.microsoft.com/office/drawing/2014/main" id="{8F39091B-6128-480A-88FF-4E143D26D533}"/>
+              </a:ext>
+            </a:extLst>
+          </p:cNvPr>
+          <p:cNvCxnSpPr/>
+          <p:nvPr/>
+        </p:nvCxnSpPr>
+        <p:spPr>
+          <a:xfrm>
+            <a:off x="1203279" y="992875"/>
+            <a:ext cx="1528548" cy="3075294"/>
+          </a:xfrm>
+          <a:prstGeom prst="curvedConnector3">
+            <a:avLst/>
+          </a:prstGeom>
+          <a:ln w="12700">
+            <a:solidFill>
+              <a:schemeClr val="tx1"/>
+            </a:solidFill>
+            <a:prstDash val="sysDot"/>
+          </a:ln>
+        </p:spPr>
+        <p:style>
+          <a:lnRef idx="1">
+            <a:schemeClr val="accent1"/>
+          </a:lnRef>
+          <a:fillRef idx="0">
+            <a:schemeClr val="accent1"/>
+          </a:fillRef>
+          <a:effectRef idx="0">
+            <a:schemeClr val="accent1"/>
+          </a:effectRef>
+          <a:fontRef idx="minor">
+            <a:schemeClr val="tx1"/>
+          </a:fontRef>
+        </p:style>
+      </p:cxnSp>
+      <p:cxnSp>
+        <p:nvCxnSpPr>
+          <p:cNvPr id="11" name="Connector: Curved 10">
+            <a:extLst>
+              <a:ext uri="{FF2B5EF4-FFF2-40B4-BE49-F238E27FC236}">
+                <a16:creationId xmlns:a16="http://schemas.microsoft.com/office/drawing/2014/main" id="{3FA0CFD9-2DEC-4F01-8BA7-A85F813D5581}"/>
+              </a:ext>
+            </a:extLst>
+          </p:cNvPr>
+          <p:cNvCxnSpPr>
+            <a:cxnSpLocks/>
+          </p:cNvCxnSpPr>
+          <p:nvPr/>
+        </p:nvCxnSpPr>
+        <p:spPr>
+          <a:xfrm>
+            <a:off x="7310650" y="1004247"/>
+            <a:ext cx="982639" cy="3484727"/>
+          </a:xfrm>
+          <a:prstGeom prst="curvedConnector3">
+            <a:avLst/>
+          </a:prstGeom>
+          <a:ln w="12700">
+            <a:solidFill>
+              <a:schemeClr val="tx1"/>
+            </a:solidFill>
+            <a:prstDash val="sysDot"/>
+          </a:ln>
+        </p:spPr>
+        <p:style>
+          <a:lnRef idx="1">
+            <a:schemeClr val="accent1"/>
+          </a:lnRef>
+          <a:fillRef idx="0">
+            <a:schemeClr val="accent1"/>
+          </a:fillRef>
+          <a:effectRef idx="0">
+            <a:schemeClr val="accent1"/>
+          </a:effectRef>
+          <a:fontRef idx="minor">
+            <a:schemeClr val="tx1"/>
+          </a:fontRef>
+        </p:style>
+      </p:cxnSp>
+      <p:cxnSp>
+        <p:nvCxnSpPr>
+          <p:cNvPr id="12" name="Connector: Curved 11">
+            <a:extLst>
+              <a:ext uri="{FF2B5EF4-FFF2-40B4-BE49-F238E27FC236}">
+                <a16:creationId xmlns:a16="http://schemas.microsoft.com/office/drawing/2014/main" id="{09CF4B84-247A-4F08-AFAA-00BA5EAB0460}"/>
+              </a:ext>
+            </a:extLst>
+          </p:cNvPr>
+          <p:cNvCxnSpPr>
+            <a:cxnSpLocks/>
+          </p:cNvCxnSpPr>
+          <p:nvPr/>
+        </p:nvCxnSpPr>
+        <p:spPr>
+          <a:xfrm>
+            <a:off x="5570560" y="3551828"/>
+            <a:ext cx="1756012" cy="584579"/>
+          </a:xfrm>
+          <a:prstGeom prst="curvedConnector3">
+            <a:avLst/>
+          </a:prstGeom>
+          <a:ln w="12700">
+            <a:solidFill>
+              <a:schemeClr val="tx1"/>
+            </a:solidFill>
+            <a:prstDash val="sysDot"/>
           </a:ln>
         </p:spPr>
         <p:style>

</xml_diff>